<commit_message>
Add Slides 2 and 3
</commit_message>
<xml_diff>
--- a/channels and go routines/Channels and Go Routines Part 3.pptx
+++ b/channels and go routines/Channels and Go Routines Part 3.pptx
@@ -7,6 +7,7 @@
   <p:sldIdLst>
     <p:sldId id="256" r:id="rId2"/>
     <p:sldId id="257" r:id="rId3"/>
+    <p:sldId id="258" r:id="rId4"/>
   </p:sldIdLst>
   <p:sldSz cx="12192000" cy="6858000"/>
   <p:notesSz cx="6858000" cy="9144000"/>
@@ -3693,6 +3694,332 @@
 </p:sld>
 </file>
 
+<file path=ppt/slides/slide3.xml><?xml version="1.0" encoding="utf-8"?>
+<p:sld xmlns:a="http://schemas.openxmlformats.org/drawingml/2006/main" xmlns:r="http://schemas.openxmlformats.org/officeDocument/2006/relationships" xmlns:p="http://schemas.openxmlformats.org/presentationml/2006/main">
+  <p:cSld>
+    <p:spTree>
+      <p:nvGrpSpPr>
+        <p:cNvPr id="1" name=""/>
+        <p:cNvGrpSpPr/>
+        <p:nvPr/>
+      </p:nvGrpSpPr>
+      <p:grpSpPr>
+        <a:xfrm>
+          <a:off x="0" y="0"/>
+          <a:ext cx="0" cy="0"/>
+          <a:chOff x="0" y="0"/>
+          <a:chExt cx="0" cy="0"/>
+        </a:xfrm>
+      </p:grpSpPr>
+      <p:sp>
+        <p:nvSpPr>
+          <p:cNvPr id="2" name="TextBox 1">
+            <a:extLst>
+              <a:ext uri="{FF2B5EF4-FFF2-40B4-BE49-F238E27FC236}">
+                <a16:creationId xmlns:a16="http://schemas.microsoft.com/office/drawing/2014/main" id="{EB9E6DE0-3D7A-406B-9917-09C25099EE1E}"/>
+              </a:ext>
+            </a:extLst>
+          </p:cNvPr>
+          <p:cNvSpPr txBox="1"/>
+          <p:nvPr/>
+        </p:nvSpPr>
+        <p:spPr>
+          <a:xfrm>
+            <a:off x="5177641" y="445324"/>
+            <a:ext cx="3663537" cy="5539978"/>
+          </a:xfrm>
+          <a:prstGeom prst="rect">
+            <a:avLst/>
+          </a:prstGeom>
+          <a:noFill/>
+        </p:spPr>
+        <p:txBody>
+          <a:bodyPr wrap="square" rtlCol="0">
+            <a:spAutoFit/>
+          </a:bodyPr>
+          <a:lstStyle/>
+          <a:p>
+            <a:r>
+              <a:rPr lang="en-US" sz="1400" dirty="0" err="1"/>
+              <a:t>func</a:t>
+            </a:r>
+            <a:r>
+              <a:rPr lang="en-US" sz="1400" dirty="0"/>
+              <a:t> main() {</a:t>
+            </a:r>
+          </a:p>
+          <a:p>
+            <a:r>
+              <a:rPr lang="en-US" sz="1400" dirty="0"/>
+              <a:t>    links := []string{</a:t>
+            </a:r>
+          </a:p>
+          <a:p>
+            <a:r>
+              <a:rPr lang="en-US" sz="1400" dirty="0"/>
+              <a:t>        "http://google.com",</a:t>
+            </a:r>
+          </a:p>
+          <a:p>
+            <a:r>
+              <a:rPr lang="en-US" sz="1400" dirty="0"/>
+              <a:t>        "http://amazon.com",</a:t>
+            </a:r>
+          </a:p>
+          <a:p>
+            <a:r>
+              <a:rPr lang="en-US" sz="1400" dirty="0"/>
+              <a:t>        "http://stackoverflow.com",</a:t>
+            </a:r>
+          </a:p>
+          <a:p>
+            <a:r>
+              <a:rPr lang="en-US" sz="1400" dirty="0"/>
+              <a:t>        "http://golang.org",</a:t>
+            </a:r>
+          </a:p>
+          <a:p>
+            <a:r>
+              <a:rPr lang="en-US" sz="1400" dirty="0"/>
+              <a:t>        "http://facebook.com",</a:t>
+            </a:r>
+          </a:p>
+          <a:p>
+            <a:r>
+              <a:rPr lang="en-US" sz="1400" dirty="0"/>
+              <a:t>    }</a:t>
+            </a:r>
+          </a:p>
+          <a:p>
+            <a:br>
+              <a:rPr lang="en-US" sz="1400" dirty="0"/>
+            </a:br>
+            <a:r>
+              <a:rPr lang="en-US" sz="1400" dirty="0"/>
+              <a:t>    for _, link := range links {</a:t>
+            </a:r>
+          </a:p>
+          <a:p>
+            <a:r>
+              <a:rPr lang="en-US" sz="1400" dirty="0"/>
+              <a:t>        </a:t>
+            </a:r>
+            <a:r>
+              <a:rPr lang="en-US" sz="1400" dirty="0" err="1"/>
+              <a:t>checkLink</a:t>
+            </a:r>
+            <a:r>
+              <a:rPr lang="en-US" sz="1400" dirty="0"/>
+              <a:t>(link)</a:t>
+            </a:r>
+          </a:p>
+          <a:p>
+            <a:r>
+              <a:rPr lang="en-US" sz="1400" dirty="0"/>
+              <a:t>    }</a:t>
+            </a:r>
+          </a:p>
+          <a:p>
+            <a:r>
+              <a:rPr lang="en-US" sz="1400" dirty="0"/>
+              <a:t>}</a:t>
+            </a:r>
+          </a:p>
+          <a:p>
+            <a:br>
+              <a:rPr lang="en-US" sz="1400" dirty="0"/>
+            </a:br>
+            <a:r>
+              <a:rPr lang="en-US" sz="1400" dirty="0" err="1"/>
+              <a:t>func</a:t>
+            </a:r>
+            <a:r>
+              <a:rPr lang="en-US" sz="1400" dirty="0"/>
+              <a:t> </a:t>
+            </a:r>
+            <a:r>
+              <a:rPr lang="en-US" sz="1400" dirty="0" err="1"/>
+              <a:t>checkLink</a:t>
+            </a:r>
+            <a:r>
+              <a:rPr lang="en-US" sz="1400" dirty="0"/>
+              <a:t>(link string) {</a:t>
+            </a:r>
+          </a:p>
+          <a:p>
+            <a:r>
+              <a:rPr lang="en-US" sz="1400" dirty="0"/>
+              <a:t>    _, err := </a:t>
+            </a:r>
+            <a:r>
+              <a:rPr lang="en-US" sz="1400" dirty="0" err="1"/>
+              <a:t>http.Get</a:t>
+            </a:r>
+            <a:r>
+              <a:rPr lang="en-US" sz="1400" dirty="0"/>
+              <a:t>(link)</a:t>
+            </a:r>
+          </a:p>
+          <a:p>
+            <a:br>
+              <a:rPr lang="en-US" sz="1400" dirty="0"/>
+            </a:br>
+            <a:r>
+              <a:rPr lang="en-US" sz="1400" dirty="0"/>
+              <a:t>    if err != nil {</a:t>
+            </a:r>
+          </a:p>
+          <a:p>
+            <a:r>
+              <a:rPr lang="en-US" sz="1400" dirty="0"/>
+              <a:t>        </a:t>
+            </a:r>
+            <a:r>
+              <a:rPr lang="en-US" sz="1400" dirty="0" err="1"/>
+              <a:t>fmt.Println</a:t>
+            </a:r>
+            <a:r>
+              <a:rPr lang="en-US" sz="1400" dirty="0"/>
+              <a:t>(link, "might be down!")</a:t>
+            </a:r>
+          </a:p>
+          <a:p>
+            <a:r>
+              <a:rPr lang="en-US" sz="1400" dirty="0"/>
+              <a:t>        return</a:t>
+            </a:r>
+          </a:p>
+          <a:p>
+            <a:r>
+              <a:rPr lang="en-US" sz="1400" dirty="0"/>
+              <a:t>    }</a:t>
+            </a:r>
+          </a:p>
+          <a:p>
+            <a:br>
+              <a:rPr lang="en-US" sz="1400" dirty="0"/>
+            </a:br>
+            <a:r>
+              <a:rPr lang="en-US" sz="1400" dirty="0"/>
+              <a:t>    </a:t>
+            </a:r>
+            <a:r>
+              <a:rPr lang="en-US" sz="1400" dirty="0" err="1"/>
+              <a:t>fmt.Println</a:t>
+            </a:r>
+            <a:r>
+              <a:rPr lang="en-US" sz="1400" dirty="0"/>
+              <a:t>(link, "is up!")</a:t>
+            </a:r>
+          </a:p>
+          <a:p>
+            <a:r>
+              <a:rPr lang="en-US" sz="1400" dirty="0"/>
+              <a:t>}</a:t>
+            </a:r>
+          </a:p>
+          <a:p>
+            <a:endParaRPr lang="en-US" dirty="0"/>
+          </a:p>
+        </p:txBody>
+      </p:sp>
+      <p:sp>
+        <p:nvSpPr>
+          <p:cNvPr id="3" name="Rectangle 2">
+            <a:extLst>
+              <a:ext uri="{FF2B5EF4-FFF2-40B4-BE49-F238E27FC236}">
+                <a16:creationId xmlns:a16="http://schemas.microsoft.com/office/drawing/2014/main" id="{31B43B85-E240-438A-8626-E4C2135D5BF5}"/>
+              </a:ext>
+            </a:extLst>
+          </p:cNvPr>
+          <p:cNvSpPr/>
+          <p:nvPr/>
+        </p:nvSpPr>
+        <p:spPr>
+          <a:xfrm>
+            <a:off x="2446317" y="1098468"/>
+            <a:ext cx="914400" cy="516576"/>
+          </a:xfrm>
+          <a:prstGeom prst="rect">
+            <a:avLst/>
+          </a:prstGeom>
+          <a:solidFill>
+            <a:schemeClr val="bg1"/>
+          </a:solidFill>
+        </p:spPr>
+        <p:style>
+          <a:lnRef idx="2">
+            <a:schemeClr val="accent1">
+              <a:shade val="50000"/>
+            </a:schemeClr>
+          </a:lnRef>
+          <a:fillRef idx="1">
+            <a:schemeClr val="accent1"/>
+          </a:fillRef>
+          <a:effectRef idx="0">
+            <a:schemeClr val="accent1"/>
+          </a:effectRef>
+          <a:fontRef idx="minor">
+            <a:schemeClr val="lt1"/>
+          </a:fontRef>
+        </p:style>
+        <p:txBody>
+          <a:bodyPr rtlCol="0" anchor="ctr"/>
+          <a:lstStyle/>
+          <a:p>
+            <a:pPr algn="ctr"/>
+            <a:endParaRPr lang="en-US" dirty="0"/>
+          </a:p>
+        </p:txBody>
+      </p:sp>
+      <p:sp>
+        <p:nvSpPr>
+          <p:cNvPr id="4" name="TextBox 3">
+            <a:extLst>
+              <a:ext uri="{FF2B5EF4-FFF2-40B4-BE49-F238E27FC236}">
+                <a16:creationId xmlns:a16="http://schemas.microsoft.com/office/drawing/2014/main" id="{972A7574-0B5B-4A37-BA90-5BD5B3905BA7}"/>
+              </a:ext>
+            </a:extLst>
+          </p:cNvPr>
+          <p:cNvSpPr txBox="1"/>
+          <p:nvPr/>
+        </p:nvSpPr>
+        <p:spPr>
+          <a:xfrm>
+            <a:off x="2446316" y="1098468"/>
+            <a:ext cx="914399" cy="461665"/>
+          </a:xfrm>
+          <a:prstGeom prst="rect">
+            <a:avLst/>
+          </a:prstGeom>
+          <a:noFill/>
+        </p:spPr>
+        <p:txBody>
+          <a:bodyPr wrap="square" rtlCol="0">
+            <a:spAutoFit/>
+          </a:bodyPr>
+          <a:lstStyle/>
+          <a:p>
+            <a:r>
+              <a:rPr lang="en-US" sz="1200" dirty="0"/>
+              <a:t>Main Go Routine</a:t>
+            </a:r>
+          </a:p>
+        </p:txBody>
+      </p:sp>
+    </p:spTree>
+    <p:extLst>
+      <p:ext uri="{BB962C8B-B14F-4D97-AF65-F5344CB8AC3E}">
+        <p14:creationId xmlns:p14="http://schemas.microsoft.com/office/powerpoint/2010/main" val="3610935539"/>
+      </p:ext>
+    </p:extLst>
+  </p:cSld>
+  <p:clrMapOvr>
+    <a:masterClrMapping/>
+  </p:clrMapOvr>
+</p:sld>
+</file>
+
 <file path=ppt/theme/theme1.xml><?xml version="1.0" encoding="utf-8"?>
 <a:theme xmlns:a="http://schemas.openxmlformats.org/drawingml/2006/main" name="Frame">
   <a:themeElements>

</xml_diff>

<commit_message>
Update to slide 3 for powerpoint Channels and Go Routines Part 3
</commit_message>
<xml_diff>
--- a/channels and go routines/Channels and Go Routines Part 3.pptx
+++ b/channels and go routines/Channels and Go Routines Part 3.pptx
@@ -3713,6 +3713,58 @@
       </p:grpSpPr>
       <p:sp>
         <p:nvSpPr>
+          <p:cNvPr id="5" name="Rectangle 4">
+            <a:extLst>
+              <a:ext uri="{FF2B5EF4-FFF2-40B4-BE49-F238E27FC236}">
+                <a16:creationId xmlns:a16="http://schemas.microsoft.com/office/drawing/2014/main" id="{D33F61D5-4B82-43AB-A645-950FBEA4478D}"/>
+              </a:ext>
+            </a:extLst>
+          </p:cNvPr>
+          <p:cNvSpPr/>
+          <p:nvPr/>
+        </p:nvSpPr>
+        <p:spPr>
+          <a:xfrm>
+            <a:off x="5973288" y="3705101"/>
+            <a:ext cx="1039091" cy="219694"/>
+          </a:xfrm>
+          <a:prstGeom prst="rect">
+            <a:avLst/>
+          </a:prstGeom>
+          <a:solidFill>
+            <a:schemeClr val="accent1">
+              <a:lumMod val="20000"/>
+              <a:lumOff val="80000"/>
+            </a:schemeClr>
+          </a:solidFill>
+        </p:spPr>
+        <p:style>
+          <a:lnRef idx="2">
+            <a:schemeClr val="accent1">
+              <a:shade val="50000"/>
+            </a:schemeClr>
+          </a:lnRef>
+          <a:fillRef idx="1">
+            <a:schemeClr val="accent1"/>
+          </a:fillRef>
+          <a:effectRef idx="0">
+            <a:schemeClr val="accent1"/>
+          </a:effectRef>
+          <a:fontRef idx="minor">
+            <a:schemeClr val="lt1"/>
+          </a:fontRef>
+        </p:style>
+        <p:txBody>
+          <a:bodyPr rtlCol="0" anchor="ctr"/>
+          <a:lstStyle/>
+          <a:p>
+            <a:pPr algn="ctr"/>
+            <a:endParaRPr lang="en-US"/>
+          </a:p>
+        </p:txBody>
+      </p:sp>
+      <p:sp>
+        <p:nvSpPr>
           <p:cNvPr id="2" name="TextBox 1">
             <a:extLst>
               <a:ext uri="{FF2B5EF4-FFF2-40B4-BE49-F238E27FC236}">
@@ -4003,6 +4055,80 @@
             <a:r>
               <a:rPr lang="en-US" sz="1200" dirty="0"/>
               <a:t>Main Go Routine</a:t>
+            </a:r>
+          </a:p>
+        </p:txBody>
+      </p:sp>
+      <p:cxnSp>
+        <p:nvCxnSpPr>
+          <p:cNvPr id="7" name="Straight Arrow Connector 6">
+            <a:extLst>
+              <a:ext uri="{FF2B5EF4-FFF2-40B4-BE49-F238E27FC236}">
+                <a16:creationId xmlns:a16="http://schemas.microsoft.com/office/drawing/2014/main" id="{744053EF-009B-4BE8-927B-BE9FC307852E}"/>
+              </a:ext>
+            </a:extLst>
+          </p:cNvPr>
+          <p:cNvCxnSpPr/>
+          <p:nvPr/>
+        </p:nvCxnSpPr>
+        <p:spPr>
+          <a:xfrm flipH="1">
+            <a:off x="7107382" y="3883231"/>
+            <a:ext cx="599704" cy="0"/>
+          </a:xfrm>
+          <a:prstGeom prst="straightConnector1">
+            <a:avLst/>
+          </a:prstGeom>
+          <a:ln>
+            <a:tailEnd type="triangle"/>
+          </a:ln>
+        </p:spPr>
+        <p:style>
+          <a:lnRef idx="1">
+            <a:schemeClr val="dk1"/>
+          </a:lnRef>
+          <a:fillRef idx="0">
+            <a:schemeClr val="dk1"/>
+          </a:fillRef>
+          <a:effectRef idx="0">
+            <a:schemeClr val="dk1"/>
+          </a:effectRef>
+          <a:fontRef idx="minor">
+            <a:schemeClr val="tx1"/>
+          </a:fontRef>
+        </p:style>
+      </p:cxnSp>
+      <p:sp>
+        <p:nvSpPr>
+          <p:cNvPr id="8" name="TextBox 7">
+            <a:extLst>
+              <a:ext uri="{FF2B5EF4-FFF2-40B4-BE49-F238E27FC236}">
+                <a16:creationId xmlns:a16="http://schemas.microsoft.com/office/drawing/2014/main" id="{0B29151E-DBFE-4B47-BCA8-4AE0F2271784}"/>
+              </a:ext>
+            </a:extLst>
+          </p:cNvPr>
+          <p:cNvSpPr txBox="1"/>
+          <p:nvPr/>
+        </p:nvSpPr>
+        <p:spPr>
+          <a:xfrm>
+            <a:off x="7713025" y="3722914"/>
+            <a:ext cx="978153" cy="276999"/>
+          </a:xfrm>
+          <a:prstGeom prst="rect">
+            <a:avLst/>
+          </a:prstGeom>
+          <a:noFill/>
+        </p:spPr>
+        <p:txBody>
+          <a:bodyPr wrap="none" rtlCol="0">
+            <a:spAutoFit/>
+          </a:bodyPr>
+          <a:lstStyle/>
+          <a:p>
+            <a:r>
+              <a:rPr lang="en-US" sz="1200" dirty="0"/>
+              <a:t>Blocking call</a:t>
             </a:r>
           </a:p>
         </p:txBody>

</xml_diff>

<commit_message>
Finish slide fpr channels and go routines part 3
</commit_message>
<xml_diff>
--- a/channels and go routines/Channels and Go Routines Part 3.pptx
+++ b/channels and go routines/Channels and Go Routines Part 3.pptx
@@ -4432,6 +4432,671 @@
           <a:chExt cx="0" cy="0"/>
         </a:xfrm>
       </p:grpSpPr>
+      <p:sp>
+        <p:nvSpPr>
+          <p:cNvPr id="2" name="Rectangle 1">
+            <a:extLst>
+              <a:ext uri="{FF2B5EF4-FFF2-40B4-BE49-F238E27FC236}">
+                <a16:creationId xmlns:a16="http://schemas.microsoft.com/office/drawing/2014/main" id="{03193D34-BFD6-4211-B1DE-155019165038}"/>
+              </a:ext>
+            </a:extLst>
+          </p:cNvPr>
+          <p:cNvSpPr/>
+          <p:nvPr/>
+        </p:nvSpPr>
+        <p:spPr>
+          <a:xfrm>
+            <a:off x="4393870" y="2571008"/>
+            <a:ext cx="219694" cy="130628"/>
+          </a:xfrm>
+          <a:prstGeom prst="rect">
+            <a:avLst/>
+          </a:prstGeom>
+          <a:solidFill>
+            <a:schemeClr val="accent3">
+              <a:lumMod val="20000"/>
+              <a:lumOff val="80000"/>
+            </a:schemeClr>
+          </a:solidFill>
+        </p:spPr>
+        <p:style>
+          <a:lnRef idx="2">
+            <a:schemeClr val="accent3">
+              <a:shade val="50000"/>
+            </a:schemeClr>
+          </a:lnRef>
+          <a:fillRef idx="1">
+            <a:schemeClr val="accent3"/>
+          </a:fillRef>
+          <a:effectRef idx="0">
+            <a:schemeClr val="accent3"/>
+          </a:effectRef>
+          <a:fontRef idx="minor">
+            <a:schemeClr val="lt1"/>
+          </a:fontRef>
+        </p:style>
+        <p:txBody>
+          <a:bodyPr rtlCol="0" anchor="ctr"/>
+          <a:lstStyle/>
+          <a:p>
+            <a:pPr algn="ctr"/>
+            <a:endParaRPr lang="en-US"/>
+          </a:p>
+        </p:txBody>
+      </p:sp>
+      <p:sp>
+        <p:nvSpPr>
+          <p:cNvPr id="3" name="Rectangle 2">
+            <a:extLst>
+              <a:ext uri="{FF2B5EF4-FFF2-40B4-BE49-F238E27FC236}">
+                <a16:creationId xmlns:a16="http://schemas.microsoft.com/office/drawing/2014/main" id="{829F7A23-7A9E-4C65-A4FD-640AB7D23B2A}"/>
+              </a:ext>
+            </a:extLst>
+          </p:cNvPr>
+          <p:cNvSpPr/>
+          <p:nvPr/>
+        </p:nvSpPr>
+        <p:spPr>
+          <a:xfrm>
+            <a:off x="2446317" y="1098468"/>
+            <a:ext cx="914400" cy="516576"/>
+          </a:xfrm>
+          <a:prstGeom prst="rect">
+            <a:avLst/>
+          </a:prstGeom>
+          <a:solidFill>
+            <a:schemeClr val="bg1"/>
+          </a:solidFill>
+        </p:spPr>
+        <p:style>
+          <a:lnRef idx="2">
+            <a:schemeClr val="accent1">
+              <a:shade val="50000"/>
+            </a:schemeClr>
+          </a:lnRef>
+          <a:fillRef idx="1">
+            <a:schemeClr val="accent1"/>
+          </a:fillRef>
+          <a:effectRef idx="0">
+            <a:schemeClr val="accent1"/>
+          </a:effectRef>
+          <a:fontRef idx="minor">
+            <a:schemeClr val="lt1"/>
+          </a:fontRef>
+        </p:style>
+        <p:txBody>
+          <a:bodyPr rtlCol="0" anchor="ctr"/>
+          <a:lstStyle/>
+          <a:p>
+            <a:pPr algn="ctr"/>
+            <a:endParaRPr lang="en-US" dirty="0"/>
+          </a:p>
+        </p:txBody>
+      </p:sp>
+      <p:sp>
+        <p:nvSpPr>
+          <p:cNvPr id="4" name="TextBox 3">
+            <a:extLst>
+              <a:ext uri="{FF2B5EF4-FFF2-40B4-BE49-F238E27FC236}">
+                <a16:creationId xmlns:a16="http://schemas.microsoft.com/office/drawing/2014/main" id="{5ED17770-2713-46AF-AFF4-92E41C4E2289}"/>
+              </a:ext>
+            </a:extLst>
+          </p:cNvPr>
+          <p:cNvSpPr txBox="1"/>
+          <p:nvPr/>
+        </p:nvSpPr>
+        <p:spPr>
+          <a:xfrm>
+            <a:off x="2446316" y="1098468"/>
+            <a:ext cx="914399" cy="461665"/>
+          </a:xfrm>
+          <a:prstGeom prst="rect">
+            <a:avLst/>
+          </a:prstGeom>
+          <a:noFill/>
+        </p:spPr>
+        <p:txBody>
+          <a:bodyPr wrap="square" rtlCol="0">
+            <a:spAutoFit/>
+          </a:bodyPr>
+          <a:lstStyle/>
+          <a:p>
+            <a:r>
+              <a:rPr lang="en-US" sz="1200" dirty="0"/>
+              <a:t>Main Go Routine</a:t>
+            </a:r>
+          </a:p>
+        </p:txBody>
+      </p:sp>
+      <p:sp>
+        <p:nvSpPr>
+          <p:cNvPr id="5" name="TextBox 4">
+            <a:extLst>
+              <a:ext uri="{FF2B5EF4-FFF2-40B4-BE49-F238E27FC236}">
+                <a16:creationId xmlns:a16="http://schemas.microsoft.com/office/drawing/2014/main" id="{EE932D98-3D70-416D-9E30-20BDBE615A0A}"/>
+              </a:ext>
+            </a:extLst>
+          </p:cNvPr>
+          <p:cNvSpPr txBox="1"/>
+          <p:nvPr/>
+        </p:nvSpPr>
+        <p:spPr>
+          <a:xfrm>
+            <a:off x="4251365" y="1009403"/>
+            <a:ext cx="1888177" cy="2123658"/>
+          </a:xfrm>
+          <a:prstGeom prst="rect">
+            <a:avLst/>
+          </a:prstGeom>
+          <a:noFill/>
+        </p:spPr>
+        <p:txBody>
+          <a:bodyPr wrap="square" rtlCol="0">
+            <a:spAutoFit/>
+          </a:bodyPr>
+          <a:lstStyle/>
+          <a:p>
+            <a:r>
+              <a:rPr lang="en-US" sz="1200" dirty="0" err="1"/>
+              <a:t>func</a:t>
+            </a:r>
+            <a:r>
+              <a:rPr lang="en-US" sz="1200" dirty="0"/>
+              <a:t> main() {</a:t>
+            </a:r>
+          </a:p>
+          <a:p>
+            <a:r>
+              <a:rPr lang="en-US" sz="1200" dirty="0"/>
+              <a:t>   links := []string {</a:t>
+            </a:r>
+          </a:p>
+          <a:p>
+            <a:r>
+              <a:rPr lang="en-US" sz="1200" dirty="0"/>
+              <a:t>      “http://google.com”,</a:t>
+            </a:r>
+          </a:p>
+          <a:p>
+            <a:endParaRPr lang="en-US" sz="1200" dirty="0"/>
+          </a:p>
+          <a:p>
+            <a:r>
+              <a:rPr lang="en-US" sz="1200" dirty="0"/>
+              <a:t>      “http://amazon.com”,</a:t>
+            </a:r>
+          </a:p>
+          <a:p>
+            <a:r>
+              <a:rPr lang="en-US" sz="1200" dirty="0"/>
+              <a:t>   }</a:t>
+            </a:r>
+          </a:p>
+          <a:p>
+            <a:endParaRPr lang="en-US" sz="1200" dirty="0"/>
+          </a:p>
+          <a:p>
+            <a:r>
+              <a:rPr lang="en-US" sz="1200" dirty="0"/>
+              <a:t>for _, link := range links {</a:t>
+            </a:r>
+          </a:p>
+          <a:p>
+            <a:r>
+              <a:rPr lang="en-US" sz="1200" dirty="0"/>
+              <a:t>   go </a:t>
+            </a:r>
+            <a:r>
+              <a:rPr lang="en-US" sz="1200" dirty="0" err="1"/>
+              <a:t>checkLink</a:t>
+            </a:r>
+            <a:r>
+              <a:rPr lang="en-US" sz="1200" dirty="0"/>
+              <a:t>(link)</a:t>
+            </a:r>
+          </a:p>
+          <a:p>
+            <a:r>
+              <a:rPr lang="en-US" sz="1200" dirty="0"/>
+              <a:t>   }</a:t>
+            </a:r>
+          </a:p>
+          <a:p>
+            <a:r>
+              <a:rPr lang="en-US" sz="1200" dirty="0"/>
+              <a:t>}</a:t>
+            </a:r>
+          </a:p>
+        </p:txBody>
+      </p:sp>
+      <p:cxnSp>
+        <p:nvCxnSpPr>
+          <p:cNvPr id="9" name="Straight Connector 8">
+            <a:extLst>
+              <a:ext uri="{FF2B5EF4-FFF2-40B4-BE49-F238E27FC236}">
+                <a16:creationId xmlns:a16="http://schemas.microsoft.com/office/drawing/2014/main" id="{AB35EC3C-409C-40E9-98E2-38D359105DC5}"/>
+              </a:ext>
+            </a:extLst>
+          </p:cNvPr>
+          <p:cNvCxnSpPr>
+            <a:cxnSpLocks/>
+          </p:cNvCxnSpPr>
+          <p:nvPr/>
+        </p:nvCxnSpPr>
+        <p:spPr>
+          <a:xfrm>
+            <a:off x="3360715" y="1347114"/>
+            <a:ext cx="581893" cy="0"/>
+          </a:xfrm>
+          <a:prstGeom prst="line">
+            <a:avLst/>
+          </a:prstGeom>
+        </p:spPr>
+        <p:style>
+          <a:lnRef idx="1">
+            <a:schemeClr val="accent1"/>
+          </a:lnRef>
+          <a:fillRef idx="0">
+            <a:schemeClr val="accent1"/>
+          </a:fillRef>
+          <a:effectRef idx="0">
+            <a:schemeClr val="accent1"/>
+          </a:effectRef>
+          <a:fontRef idx="minor">
+            <a:schemeClr val="tx1"/>
+          </a:fontRef>
+        </p:style>
+      </p:cxnSp>
+      <p:cxnSp>
+        <p:nvCxnSpPr>
+          <p:cNvPr id="12" name="Straight Connector 11">
+            <a:extLst>
+              <a:ext uri="{FF2B5EF4-FFF2-40B4-BE49-F238E27FC236}">
+                <a16:creationId xmlns:a16="http://schemas.microsoft.com/office/drawing/2014/main" id="{095E0370-DC02-49F0-BB6F-BD63A7732828}"/>
+              </a:ext>
+            </a:extLst>
+          </p:cNvPr>
+          <p:cNvCxnSpPr/>
+          <p:nvPr/>
+        </p:nvCxnSpPr>
+        <p:spPr>
+          <a:xfrm>
+            <a:off x="3942608" y="1353787"/>
+            <a:ext cx="0" cy="1294410"/>
+          </a:xfrm>
+          <a:prstGeom prst="line">
+            <a:avLst/>
+          </a:prstGeom>
+        </p:spPr>
+        <p:style>
+          <a:lnRef idx="1">
+            <a:schemeClr val="accent1"/>
+          </a:lnRef>
+          <a:fillRef idx="0">
+            <a:schemeClr val="accent1"/>
+          </a:fillRef>
+          <a:effectRef idx="0">
+            <a:schemeClr val="accent1"/>
+          </a:effectRef>
+          <a:fontRef idx="minor">
+            <a:schemeClr val="tx1"/>
+          </a:fontRef>
+        </p:style>
+      </p:cxnSp>
+      <p:cxnSp>
+        <p:nvCxnSpPr>
+          <p:cNvPr id="14" name="Straight Arrow Connector 13">
+            <a:extLst>
+              <a:ext uri="{FF2B5EF4-FFF2-40B4-BE49-F238E27FC236}">
+                <a16:creationId xmlns:a16="http://schemas.microsoft.com/office/drawing/2014/main" id="{38B976AD-2F9A-41B4-B8EC-9DF469E10302}"/>
+              </a:ext>
+            </a:extLst>
+          </p:cNvPr>
+          <p:cNvCxnSpPr/>
+          <p:nvPr/>
+        </p:nvCxnSpPr>
+        <p:spPr>
+          <a:xfrm>
+            <a:off x="3942608" y="2648197"/>
+            <a:ext cx="403761" cy="0"/>
+          </a:xfrm>
+          <a:prstGeom prst="straightConnector1">
+            <a:avLst/>
+          </a:prstGeom>
+          <a:ln>
+            <a:tailEnd type="triangle"/>
+          </a:ln>
+        </p:spPr>
+        <p:style>
+          <a:lnRef idx="1">
+            <a:schemeClr val="accent1"/>
+          </a:lnRef>
+          <a:fillRef idx="0">
+            <a:schemeClr val="accent1"/>
+          </a:fillRef>
+          <a:effectRef idx="0">
+            <a:schemeClr val="accent1"/>
+          </a:effectRef>
+          <a:fontRef idx="minor">
+            <a:schemeClr val="tx1"/>
+          </a:fontRef>
+        </p:style>
+      </p:cxnSp>
+      <p:sp>
+        <p:nvSpPr>
+          <p:cNvPr id="15" name="Rectangle 14">
+            <a:extLst>
+              <a:ext uri="{FF2B5EF4-FFF2-40B4-BE49-F238E27FC236}">
+                <a16:creationId xmlns:a16="http://schemas.microsoft.com/office/drawing/2014/main" id="{C50C7581-E936-4F7C-814D-FE935F04A66F}"/>
+              </a:ext>
+            </a:extLst>
+          </p:cNvPr>
+          <p:cNvSpPr/>
+          <p:nvPr/>
+        </p:nvSpPr>
+        <p:spPr>
+          <a:xfrm>
+            <a:off x="2446315" y="4356266"/>
+            <a:ext cx="914400" cy="516576"/>
+          </a:xfrm>
+          <a:prstGeom prst="rect">
+            <a:avLst/>
+          </a:prstGeom>
+          <a:solidFill>
+            <a:schemeClr val="bg1"/>
+          </a:solidFill>
+        </p:spPr>
+        <p:style>
+          <a:lnRef idx="2">
+            <a:schemeClr val="accent1">
+              <a:shade val="50000"/>
+            </a:schemeClr>
+          </a:lnRef>
+          <a:fillRef idx="1">
+            <a:schemeClr val="accent1"/>
+          </a:fillRef>
+          <a:effectRef idx="0">
+            <a:schemeClr val="accent1"/>
+          </a:effectRef>
+          <a:fontRef idx="minor">
+            <a:schemeClr val="lt1"/>
+          </a:fontRef>
+        </p:style>
+        <p:txBody>
+          <a:bodyPr rtlCol="0" anchor="ctr"/>
+          <a:lstStyle/>
+          <a:p>
+            <a:pPr algn="ctr"/>
+            <a:endParaRPr lang="en-US" dirty="0"/>
+          </a:p>
+        </p:txBody>
+      </p:sp>
+      <p:sp>
+        <p:nvSpPr>
+          <p:cNvPr id="16" name="TextBox 15">
+            <a:extLst>
+              <a:ext uri="{FF2B5EF4-FFF2-40B4-BE49-F238E27FC236}">
+                <a16:creationId xmlns:a16="http://schemas.microsoft.com/office/drawing/2014/main" id="{699D0237-EE85-44BD-AAB6-A689F9712439}"/>
+              </a:ext>
+            </a:extLst>
+          </p:cNvPr>
+          <p:cNvSpPr txBox="1"/>
+          <p:nvPr/>
+        </p:nvSpPr>
+        <p:spPr>
+          <a:xfrm>
+            <a:off x="2446314" y="4356266"/>
+            <a:ext cx="914399" cy="276999"/>
+          </a:xfrm>
+          <a:prstGeom prst="rect">
+            <a:avLst/>
+          </a:prstGeom>
+          <a:noFill/>
+        </p:spPr>
+        <p:txBody>
+          <a:bodyPr wrap="square" rtlCol="0">
+            <a:spAutoFit/>
+          </a:bodyPr>
+          <a:lstStyle/>
+          <a:p>
+            <a:r>
+              <a:rPr lang="en-US" sz="1200" dirty="0"/>
+              <a:t>Go Routine</a:t>
+            </a:r>
+          </a:p>
+        </p:txBody>
+      </p:sp>
+      <p:sp>
+        <p:nvSpPr>
+          <p:cNvPr id="17" name="Rectangle 16">
+            <a:extLst>
+              <a:ext uri="{FF2B5EF4-FFF2-40B4-BE49-F238E27FC236}">
+                <a16:creationId xmlns:a16="http://schemas.microsoft.com/office/drawing/2014/main" id="{AF33EE01-5F3E-492D-A5DC-FA0018D4A98F}"/>
+              </a:ext>
+            </a:extLst>
+          </p:cNvPr>
+          <p:cNvSpPr/>
+          <p:nvPr/>
+        </p:nvSpPr>
+        <p:spPr>
+          <a:xfrm>
+            <a:off x="4207822" y="3730877"/>
+            <a:ext cx="1888178" cy="2308324"/>
+          </a:xfrm>
+          <a:prstGeom prst="rect">
+            <a:avLst/>
+          </a:prstGeom>
+        </p:spPr>
+        <p:txBody>
+          <a:bodyPr wrap="square">
+            <a:spAutoFit/>
+          </a:bodyPr>
+          <a:lstStyle/>
+          <a:p>
+            <a:r>
+              <a:rPr lang="en-US" sz="1200" dirty="0" err="1"/>
+              <a:t>func</a:t>
+            </a:r>
+            <a:r>
+              <a:rPr lang="en-US" sz="1200" dirty="0"/>
+              <a:t> </a:t>
+            </a:r>
+            <a:r>
+              <a:rPr lang="en-US" sz="1200" dirty="0" err="1"/>
+              <a:t>checkLink</a:t>
+            </a:r>
+            <a:r>
+              <a:rPr lang="en-US" sz="1200" dirty="0"/>
+              <a:t>(link string) {</a:t>
+            </a:r>
+          </a:p>
+          <a:p>
+            <a:r>
+              <a:rPr lang="en-US" sz="1200" dirty="0"/>
+              <a:t>    _, err := </a:t>
+            </a:r>
+            <a:r>
+              <a:rPr lang="en-US" sz="1200" dirty="0" err="1"/>
+              <a:t>http.Get</a:t>
+            </a:r>
+            <a:r>
+              <a:rPr lang="en-US" sz="1200" dirty="0"/>
+              <a:t>(link)</a:t>
+            </a:r>
+          </a:p>
+          <a:p>
+            <a:br>
+              <a:rPr lang="en-US" sz="1200" dirty="0"/>
+            </a:br>
+            <a:r>
+              <a:rPr lang="en-US" sz="1200" dirty="0"/>
+              <a:t>    if err != nil {</a:t>
+            </a:r>
+          </a:p>
+          <a:p>
+            <a:r>
+              <a:rPr lang="en-US" sz="1200" dirty="0"/>
+              <a:t>        </a:t>
+            </a:r>
+            <a:r>
+              <a:rPr lang="en-US" sz="1200" dirty="0" err="1"/>
+              <a:t>fmt.Println</a:t>
+            </a:r>
+            <a:r>
+              <a:rPr lang="en-US" sz="1200" dirty="0"/>
+              <a:t>(link, "might be down!")</a:t>
+            </a:r>
+          </a:p>
+          <a:p>
+            <a:r>
+              <a:rPr lang="en-US" sz="1200" dirty="0"/>
+              <a:t>        return</a:t>
+            </a:r>
+          </a:p>
+          <a:p>
+            <a:r>
+              <a:rPr lang="en-US" sz="1200" dirty="0"/>
+              <a:t>    }</a:t>
+            </a:r>
+          </a:p>
+          <a:p>
+            <a:br>
+              <a:rPr lang="en-US" sz="1200" dirty="0"/>
+            </a:br>
+            <a:r>
+              <a:rPr lang="en-US" sz="1200" dirty="0"/>
+              <a:t>    </a:t>
+            </a:r>
+            <a:r>
+              <a:rPr lang="en-US" sz="1200" dirty="0" err="1"/>
+              <a:t>fmt.Println</a:t>
+            </a:r>
+            <a:r>
+              <a:rPr lang="en-US" sz="1200" dirty="0"/>
+              <a:t>(link, "is up!")</a:t>
+            </a:r>
+          </a:p>
+          <a:p>
+            <a:r>
+              <a:rPr lang="en-US" sz="1200" dirty="0"/>
+              <a:t>}</a:t>
+            </a:r>
+          </a:p>
+        </p:txBody>
+      </p:sp>
+      <p:cxnSp>
+        <p:nvCxnSpPr>
+          <p:cNvPr id="19" name="Straight Connector 18">
+            <a:extLst>
+              <a:ext uri="{FF2B5EF4-FFF2-40B4-BE49-F238E27FC236}">
+                <a16:creationId xmlns:a16="http://schemas.microsoft.com/office/drawing/2014/main" id="{75854D89-67B3-4D42-9B02-65CDE92662AF}"/>
+              </a:ext>
+            </a:extLst>
+          </p:cNvPr>
+          <p:cNvCxnSpPr>
+            <a:stCxn id="16" idx="3"/>
+          </p:cNvCxnSpPr>
+          <p:nvPr/>
+        </p:nvCxnSpPr>
+        <p:spPr>
+          <a:xfrm flipV="1">
+            <a:off x="3360713" y="4494765"/>
+            <a:ext cx="445329" cy="1"/>
+          </a:xfrm>
+          <a:prstGeom prst="line">
+            <a:avLst/>
+          </a:prstGeom>
+        </p:spPr>
+        <p:style>
+          <a:lnRef idx="1">
+            <a:schemeClr val="accent1"/>
+          </a:lnRef>
+          <a:fillRef idx="0">
+            <a:schemeClr val="accent1"/>
+          </a:fillRef>
+          <a:effectRef idx="0">
+            <a:schemeClr val="accent1"/>
+          </a:effectRef>
+          <a:fontRef idx="minor">
+            <a:schemeClr val="tx1"/>
+          </a:fontRef>
+        </p:style>
+      </p:cxnSp>
+      <p:cxnSp>
+        <p:nvCxnSpPr>
+          <p:cNvPr id="21" name="Straight Connector 20">
+            <a:extLst>
+              <a:ext uri="{FF2B5EF4-FFF2-40B4-BE49-F238E27FC236}">
+                <a16:creationId xmlns:a16="http://schemas.microsoft.com/office/drawing/2014/main" id="{A644EE41-8AD0-4887-8C72-7F09F609667F}"/>
+              </a:ext>
+            </a:extLst>
+          </p:cNvPr>
+          <p:cNvCxnSpPr/>
+          <p:nvPr/>
+        </p:nvCxnSpPr>
+        <p:spPr>
+          <a:xfrm flipV="1">
+            <a:off x="3800104" y="4301355"/>
+            <a:ext cx="0" cy="193410"/>
+          </a:xfrm>
+          <a:prstGeom prst="line">
+            <a:avLst/>
+          </a:prstGeom>
+        </p:spPr>
+        <p:style>
+          <a:lnRef idx="1">
+            <a:schemeClr val="accent1"/>
+          </a:lnRef>
+          <a:fillRef idx="0">
+            <a:schemeClr val="accent1"/>
+          </a:fillRef>
+          <a:effectRef idx="0">
+            <a:schemeClr val="accent1"/>
+          </a:effectRef>
+          <a:fontRef idx="minor">
+            <a:schemeClr val="tx1"/>
+          </a:fontRef>
+        </p:style>
+      </p:cxnSp>
+      <p:cxnSp>
+        <p:nvCxnSpPr>
+          <p:cNvPr id="25" name="Straight Arrow Connector 24">
+            <a:extLst>
+              <a:ext uri="{FF2B5EF4-FFF2-40B4-BE49-F238E27FC236}">
+                <a16:creationId xmlns:a16="http://schemas.microsoft.com/office/drawing/2014/main" id="{175EAD5D-7BFA-48C2-8AE0-DD2154A1FE7B}"/>
+              </a:ext>
+            </a:extLst>
+          </p:cNvPr>
+          <p:cNvCxnSpPr/>
+          <p:nvPr/>
+        </p:nvCxnSpPr>
+        <p:spPr>
+          <a:xfrm>
+            <a:off x="3800104" y="4301355"/>
+            <a:ext cx="492826" cy="0"/>
+          </a:xfrm>
+          <a:prstGeom prst="straightConnector1">
+            <a:avLst/>
+          </a:prstGeom>
+          <a:ln>
+            <a:tailEnd type="triangle"/>
+          </a:ln>
+        </p:spPr>
+        <p:style>
+          <a:lnRef idx="1">
+            <a:schemeClr val="accent1"/>
+          </a:lnRef>
+          <a:fillRef idx="0">
+            <a:schemeClr val="accent1"/>
+          </a:fillRef>
+          <a:effectRef idx="0">
+            <a:schemeClr val="accent1"/>
+          </a:effectRef>
+          <a:fontRef idx="minor">
+            <a:schemeClr val="tx1"/>
+          </a:fontRef>
+        </p:style>
+      </p:cxnSp>
     </p:spTree>
     <p:extLst>
       <p:ext uri="{BB962C8B-B14F-4D97-AF65-F5344CB8AC3E}">

</xml_diff>